<commit_message>
Qt + Cef, clone the https://github.com/tishion/QCefView repo for integration
</commit_message>
<xml_diff>
--- a/cefclient analysis.pptx
+++ b/cefclient analysis.pptx
@@ -266,7 +266,7 @@
           <a:p>
             <a:fld id="{5033E7CF-4E71-4BF9-87D5-BDE1343927F4}" type="datetimeFigureOut">
               <a:rPr lang="ko-KR" altLang="en-US" smtClean="0"/>
-              <a:t>2022-01-02</a:t>
+              <a:t>2022-01-03</a:t>
             </a:fld>
             <a:endParaRPr lang="ko-KR" altLang="en-US"/>
           </a:p>
@@ -464,7 +464,7 @@
           <a:p>
             <a:fld id="{5033E7CF-4E71-4BF9-87D5-BDE1343927F4}" type="datetimeFigureOut">
               <a:rPr lang="ko-KR" altLang="en-US" smtClean="0"/>
-              <a:t>2022-01-02</a:t>
+              <a:t>2022-01-03</a:t>
             </a:fld>
             <a:endParaRPr lang="ko-KR" altLang="en-US"/>
           </a:p>
@@ -672,7 +672,7 @@
           <a:p>
             <a:fld id="{5033E7CF-4E71-4BF9-87D5-BDE1343927F4}" type="datetimeFigureOut">
               <a:rPr lang="ko-KR" altLang="en-US" smtClean="0"/>
-              <a:t>2022-01-02</a:t>
+              <a:t>2022-01-03</a:t>
             </a:fld>
             <a:endParaRPr lang="ko-KR" altLang="en-US"/>
           </a:p>
@@ -870,7 +870,7 @@
           <a:p>
             <a:fld id="{5033E7CF-4E71-4BF9-87D5-BDE1343927F4}" type="datetimeFigureOut">
               <a:rPr lang="ko-KR" altLang="en-US" smtClean="0"/>
-              <a:t>2022-01-02</a:t>
+              <a:t>2022-01-03</a:t>
             </a:fld>
             <a:endParaRPr lang="ko-KR" altLang="en-US"/>
           </a:p>
@@ -1145,7 +1145,7 @@
           <a:p>
             <a:fld id="{5033E7CF-4E71-4BF9-87D5-BDE1343927F4}" type="datetimeFigureOut">
               <a:rPr lang="ko-KR" altLang="en-US" smtClean="0"/>
-              <a:t>2022-01-02</a:t>
+              <a:t>2022-01-03</a:t>
             </a:fld>
             <a:endParaRPr lang="ko-KR" altLang="en-US"/>
           </a:p>
@@ -1410,7 +1410,7 @@
           <a:p>
             <a:fld id="{5033E7CF-4E71-4BF9-87D5-BDE1343927F4}" type="datetimeFigureOut">
               <a:rPr lang="ko-KR" altLang="en-US" smtClean="0"/>
-              <a:t>2022-01-02</a:t>
+              <a:t>2022-01-03</a:t>
             </a:fld>
             <a:endParaRPr lang="ko-KR" altLang="en-US"/>
           </a:p>
@@ -1822,7 +1822,7 @@
           <a:p>
             <a:fld id="{5033E7CF-4E71-4BF9-87D5-BDE1343927F4}" type="datetimeFigureOut">
               <a:rPr lang="ko-KR" altLang="en-US" smtClean="0"/>
-              <a:t>2022-01-02</a:t>
+              <a:t>2022-01-03</a:t>
             </a:fld>
             <a:endParaRPr lang="ko-KR" altLang="en-US"/>
           </a:p>
@@ -1963,7 +1963,7 @@
           <a:p>
             <a:fld id="{5033E7CF-4E71-4BF9-87D5-BDE1343927F4}" type="datetimeFigureOut">
               <a:rPr lang="ko-KR" altLang="en-US" smtClean="0"/>
-              <a:t>2022-01-02</a:t>
+              <a:t>2022-01-03</a:t>
             </a:fld>
             <a:endParaRPr lang="ko-KR" altLang="en-US"/>
           </a:p>
@@ -2076,7 +2076,7 @@
           <a:p>
             <a:fld id="{5033E7CF-4E71-4BF9-87D5-BDE1343927F4}" type="datetimeFigureOut">
               <a:rPr lang="ko-KR" altLang="en-US" smtClean="0"/>
-              <a:t>2022-01-02</a:t>
+              <a:t>2022-01-03</a:t>
             </a:fld>
             <a:endParaRPr lang="ko-KR" altLang="en-US"/>
           </a:p>
@@ -2387,7 +2387,7 @@
           <a:p>
             <a:fld id="{5033E7CF-4E71-4BF9-87D5-BDE1343927F4}" type="datetimeFigureOut">
               <a:rPr lang="ko-KR" altLang="en-US" smtClean="0"/>
-              <a:t>2022-01-02</a:t>
+              <a:t>2022-01-03</a:t>
             </a:fld>
             <a:endParaRPr lang="ko-KR" altLang="en-US"/>
           </a:p>
@@ -2675,7 +2675,7 @@
           <a:p>
             <a:fld id="{5033E7CF-4E71-4BF9-87D5-BDE1343927F4}" type="datetimeFigureOut">
               <a:rPr lang="ko-KR" altLang="en-US" smtClean="0"/>
-              <a:t>2022-01-02</a:t>
+              <a:t>2022-01-03</a:t>
             </a:fld>
             <a:endParaRPr lang="ko-KR" altLang="en-US"/>
           </a:p>
@@ -2916,7 +2916,7 @@
           <a:p>
             <a:fld id="{5033E7CF-4E71-4BF9-87D5-BDE1343927F4}" type="datetimeFigureOut">
               <a:rPr lang="ko-KR" altLang="en-US" smtClean="0"/>
-              <a:t>2022-01-02</a:t>
+              <a:t>2022-01-03</a:t>
             </a:fld>
             <a:endParaRPr lang="ko-KR" altLang="en-US"/>
           </a:p>
@@ -5576,7 +5576,7 @@
             </a:r>
             <a:r>
               <a:rPr lang="en-US" altLang="ko-KR" dirty="0" err="1"/>
-              <a:t>CLientHandlerStd</a:t>
+              <a:t>ClientHandlerStd</a:t>
             </a:r>
             <a:endParaRPr lang="en-US" altLang="ko-KR" dirty="0"/>
           </a:p>

</xml_diff>